<commit_message>
updates for PREMUS and Japanese edition book
</commit_message>
<xml_diff>
--- a/MapofEigenvalues-v1.1.pptx
+++ b/MapofEigenvalues-v1.1.pptx
@@ -210,7 +210,7 @@
           <a:p>
             <a:fld id="{B48BDBE6-3B77-FA42-B401-992CB5C9A3FB}" type="datetimeFigureOut">
               <a:rPr kumimoji="1" lang="ja-JP" altLang="en-US" smtClean="0"/>
-              <a:t>2022/11/8</a:t>
+              <a:t>2023/3/2</a:t>
             </a:fld>
             <a:endParaRPr kumimoji="1" lang="ja-JP" altLang="en-US"/>
           </a:p>
@@ -640,7 +640,7 @@
           <a:p>
             <a:fld id="{D2DE5DB0-24ED-0647-A0FF-641EC2D8D3C0}" type="datetime1">
               <a:rPr kumimoji="1" lang="ja-JP" altLang="en-US" smtClean="0"/>
-              <a:t>2022/11/8</a:t>
+              <a:t>2023/3/2</a:t>
             </a:fld>
             <a:endParaRPr kumimoji="1" lang="ja-JP" altLang="en-US"/>
           </a:p>
@@ -850,7 +850,7 @@
           <a:p>
             <a:fld id="{4FEB9B3B-4728-2147-8605-7DEB1062D5F3}" type="datetime1">
               <a:rPr kumimoji="1" lang="ja-JP" altLang="en-US" smtClean="0"/>
-              <a:t>2022/11/8</a:t>
+              <a:t>2023/3/2</a:t>
             </a:fld>
             <a:endParaRPr kumimoji="1" lang="ja-JP" altLang="en-US"/>
           </a:p>
@@ -1070,7 +1070,7 @@
           <a:p>
             <a:fld id="{D822A63C-F9EF-5B49-9281-1FD6DE739325}" type="datetime1">
               <a:rPr kumimoji="1" lang="ja-JP" altLang="en-US" smtClean="0"/>
-              <a:t>2022/11/8</a:t>
+              <a:t>2023/3/2</a:t>
             </a:fld>
             <a:endParaRPr kumimoji="1" lang="ja-JP" altLang="en-US"/>
           </a:p>
@@ -1280,7 +1280,7 @@
           <a:p>
             <a:fld id="{2A7241EB-A652-2245-878D-D599B2AA2DE1}" type="datetime1">
               <a:rPr kumimoji="1" lang="ja-JP" altLang="en-US" smtClean="0"/>
-              <a:t>2022/11/8</a:t>
+              <a:t>2023/3/2</a:t>
             </a:fld>
             <a:endParaRPr kumimoji="1" lang="ja-JP" altLang="en-US"/>
           </a:p>
@@ -1534,7 +1534,7 @@
           <a:p>
             <a:fld id="{CAB2BECD-D4D7-A04B-8B2E-7821E46C292D}" type="datetime1">
               <a:rPr kumimoji="1" lang="ja-JP" altLang="en-US" smtClean="0"/>
-              <a:t>2022/11/8</a:t>
+              <a:t>2023/3/2</a:t>
             </a:fld>
             <a:endParaRPr kumimoji="1" lang="ja-JP" altLang="en-US"/>
           </a:p>
@@ -1838,7 +1838,7 @@
           <a:p>
             <a:fld id="{C2C4245E-8A7B-FE48-AD8A-240D35F3CE47}" type="datetime1">
               <a:rPr kumimoji="1" lang="ja-JP" altLang="en-US" smtClean="0"/>
-              <a:t>2022/11/8</a:t>
+              <a:t>2023/3/2</a:t>
             </a:fld>
             <a:endParaRPr kumimoji="1" lang="ja-JP" altLang="en-US"/>
           </a:p>
@@ -2277,7 +2277,7 @@
           <a:p>
             <a:fld id="{9CBE2ADF-6037-A84F-BB5D-173A75F7B3B9}" type="datetime1">
               <a:rPr kumimoji="1" lang="ja-JP" altLang="en-US" smtClean="0"/>
-              <a:t>2022/11/8</a:t>
+              <a:t>2023/3/2</a:t>
             </a:fld>
             <a:endParaRPr kumimoji="1" lang="ja-JP" altLang="en-US"/>
           </a:p>
@@ -2403,7 +2403,7 @@
           <a:p>
             <a:fld id="{9F54DA4F-6209-E24F-85D9-F1F0FD5E9DB3}" type="datetime1">
               <a:rPr kumimoji="1" lang="ja-JP" altLang="en-US" smtClean="0"/>
-              <a:t>2022/11/8</a:t>
+              <a:t>2023/3/2</a:t>
             </a:fld>
             <a:endParaRPr kumimoji="1" lang="ja-JP" altLang="en-US"/>
           </a:p>
@@ -2506,7 +2506,7 @@
           <a:p>
             <a:fld id="{AFAB5A62-A7F2-4749-89AB-14E750C5D0B3}" type="datetime1">
               <a:rPr kumimoji="1" lang="ja-JP" altLang="en-US" smtClean="0"/>
-              <a:t>2022/11/8</a:t>
+              <a:t>2023/3/2</a:t>
             </a:fld>
             <a:endParaRPr kumimoji="1" lang="ja-JP" altLang="en-US"/>
           </a:p>
@@ -2823,7 +2823,7 @@
           <a:p>
             <a:fld id="{6AAF3263-1978-F342-899D-E282F8646536}" type="datetime1">
               <a:rPr kumimoji="1" lang="ja-JP" altLang="en-US" smtClean="0"/>
-              <a:t>2022/11/8</a:t>
+              <a:t>2023/3/2</a:t>
             </a:fld>
             <a:endParaRPr kumimoji="1" lang="ja-JP" altLang="en-US"/>
           </a:p>
@@ -3088,7 +3088,7 @@
           <a:p>
             <a:fld id="{4B419A92-5141-7249-9135-7D8E0F076278}" type="datetime1">
               <a:rPr kumimoji="1" lang="ja-JP" altLang="en-US" smtClean="0"/>
-              <a:t>2022/11/8</a:t>
+              <a:t>2023/3/2</a:t>
             </a:fld>
             <a:endParaRPr kumimoji="1" lang="ja-JP" altLang="en-US"/>
           </a:p>
@@ -3344,7 +3344,7 @@
             <a:fld id="{BC290475-D272-2848-83E8-BEB25ED3C463}" type="datetime1">
               <a:rPr kumimoji="1" lang="ja-JP" altLang="en-US" smtClean="0"/>
               <a:pPr/>
-              <a:t>2022/11/8</a:t>
+              <a:t>2023/3/2</a:t>
             </a:fld>
             <a:endParaRPr kumimoji="1" lang="ja-JP" altLang="en-US"/>
           </a:p>
@@ -9370,8 +9370,8 @@
             </a:p>
           </p:txBody>
         </p:sp>
-        <mc:AlternateContent xmlns:mc="http://schemas.openxmlformats.org/markup-compatibility/2006" xmlns:a14="http://schemas.microsoft.com/office/drawing/2010/main">
-          <mc:Choice Requires="a14">
+        <mc:AlternateContent xmlns:mc="http://schemas.openxmlformats.org/markup-compatibility/2006">
+          <mc:Choice xmlns:a14="http://schemas.microsoft.com/office/drawing/2010/main" Requires="a14">
             <p:sp>
               <p:nvSpPr>
                 <p:cNvPr id="166" name="正方形/長方形 165">
@@ -9450,7 +9450,7 @@
                                     <a:rPr kumimoji="1" lang="en-US" altLang="ja-JP" sz="600" b="0" i="1" smtClean="0">
                                       <a:latin typeface="Cambria Math" panose="02040503050406030204" pitchFamily="18" charset="0"/>
                                     </a:rPr>
-                                    <m:t>0</m:t>
+                                    <m:t>   0</m:t>
                                   </m:r>
                                 </m:e>
                                 <m:e>
@@ -9458,7 +9458,7 @@
                                     <a:rPr kumimoji="1" lang="en-US" altLang="ja-JP" sz="600" b="0" i="1" smtClean="0">
                                       <a:latin typeface="Cambria Math" panose="02040503050406030204" pitchFamily="18" charset="0"/>
                                     </a:rPr>
-                                    <m:t>0</m:t>
+                                    <m:t>   0</m:t>
                                   </m:r>
                                 </m:e>
                               </m:mr>
@@ -9484,7 +9484,7 @@
                                     <a:rPr kumimoji="1" lang="en-US" altLang="ja-JP" sz="600" b="0" i="1" smtClean="0">
                                       <a:latin typeface="Cambria Math" panose="02040503050406030204" pitchFamily="18" charset="0"/>
                                     </a:rPr>
-                                    <m:t>1</m:t>
+                                    <m:t>   1</m:t>
                                   </m:r>
                                 </m:e>
                               </m:mr>
@@ -9525,7 +9525,7 @@
               </p:txBody>
             </p:sp>
           </mc:Choice>
-          <mc:Fallback xmlns="">
+          <mc:Fallback>
             <p:sp>
               <p:nvSpPr>
                 <p:cNvPr id="166" name="正方形/長方形 165">
@@ -10217,8 +10217,8 @@
             </a:p>
           </p:txBody>
         </p:sp>
-        <mc:AlternateContent xmlns:mc="http://schemas.openxmlformats.org/markup-compatibility/2006" xmlns:a14="http://schemas.microsoft.com/office/drawing/2010/main">
-          <mc:Choice Requires="a14">
+        <mc:AlternateContent xmlns:mc="http://schemas.openxmlformats.org/markup-compatibility/2006">
+          <mc:Choice xmlns:a14="http://schemas.microsoft.com/office/drawing/2010/main" Requires="a14">
             <p:sp>
               <p:nvSpPr>
                 <p:cNvPr id="167" name="正方形/長方形 166">
@@ -10297,7 +10297,7 @@
                                     <a:rPr kumimoji="1" lang="en-US" altLang="ja-JP" sz="600" b="0" i="1" smtClean="0">
                                       <a:latin typeface="Cambria Math" panose="02040503050406030204" pitchFamily="18" charset="0"/>
                                     </a:rPr>
-                                    <m:t>0</m:t>
+                                    <m:t>   0</m:t>
                                   </m:r>
                                 </m:e>
                                 <m:e>
@@ -10305,7 +10305,7 @@
                                     <a:rPr kumimoji="1" lang="en-US" altLang="ja-JP" sz="600" b="0" i="1" smtClean="0">
                                       <a:latin typeface="Cambria Math" panose="02040503050406030204" pitchFamily="18" charset="0"/>
                                     </a:rPr>
-                                    <m:t>0</m:t>
+                                    <m:t>   0</m:t>
                                   </m:r>
                                 </m:e>
                               </m:mr>
@@ -10331,7 +10331,7 @@
                                     <a:rPr kumimoji="1" lang="en-US" altLang="ja-JP" sz="600" b="0" i="1" smtClean="0">
                                       <a:latin typeface="Cambria Math" panose="02040503050406030204" pitchFamily="18" charset="0"/>
                                     </a:rPr>
-                                    <m:t>1</m:t>
+                                    <m:t>   1</m:t>
                                   </m:r>
                                 </m:e>
                               </m:mr>
@@ -10372,7 +10372,7 @@
               </p:txBody>
             </p:sp>
           </mc:Choice>
-          <mc:Fallback xmlns="">
+          <mc:Fallback>
             <p:sp>
               <p:nvSpPr>
                 <p:cNvPr id="167" name="正方形/長方形 166">
@@ -11135,8 +11135,8 @@
             </p:sp>
           </mc:Fallback>
         </mc:AlternateContent>
-        <mc:AlternateContent xmlns:mc="http://schemas.openxmlformats.org/markup-compatibility/2006" xmlns:a14="http://schemas.microsoft.com/office/drawing/2010/main">
-          <mc:Choice Requires="a14">
+        <mc:AlternateContent xmlns:mc="http://schemas.openxmlformats.org/markup-compatibility/2006">
+          <mc:Choice xmlns:a14="http://schemas.microsoft.com/office/drawing/2010/main" Requires="a14">
             <p:sp>
               <p:nvSpPr>
                 <p:cNvPr id="174" name="正方形/長方形 173">
@@ -11207,6 +11207,12 @@
                                     <a:rPr kumimoji="1" lang="en-US" altLang="ja-JP" sz="600" b="0" i="1" smtClean="0">
                                       <a:latin typeface="Cambria Math" panose="02040503050406030204" pitchFamily="18" charset="0"/>
                                     </a:rPr>
+                                    <m:t>   </m:t>
+                                  </m:r>
+                                  <m:r>
+                                    <a:rPr kumimoji="1" lang="en-US" altLang="ja-JP" sz="600" b="0" i="1" smtClean="0">
+                                      <a:latin typeface="Cambria Math" panose="02040503050406030204" pitchFamily="18" charset="0"/>
+                                    </a:rPr>
                                     <m:t>0</m:t>
                                   </m:r>
                                 </m:e>
@@ -11241,7 +11247,7 @@
                                     <a:rPr kumimoji="1" lang="en-US" altLang="ja-JP" sz="600" b="0" i="1" smtClean="0">
                                       <a:latin typeface="Cambria Math" panose="02040503050406030204" pitchFamily="18" charset="0"/>
                                     </a:rPr>
-                                    <m:t>0</m:t>
+                                    <m:t>   0</m:t>
                                   </m:r>
                                 </m:e>
                                 <m:e>
@@ -11275,7 +11281,7 @@
                                     <a:rPr kumimoji="1" lang="en-US" altLang="ja-JP" sz="600" b="0" i="1" smtClean="0">
                                       <a:latin typeface="Cambria Math" panose="02040503050406030204" pitchFamily="18" charset="0"/>
                                     </a:rPr>
-                                    <m:t>0</m:t>
+                                    <m:t>   0</m:t>
                                   </m:r>
                                 </m:e>
                               </m:mr>
@@ -11290,7 +11296,7 @@
               </p:txBody>
             </p:sp>
           </mc:Choice>
-          <mc:Fallback xmlns="">
+          <mc:Fallback>
             <p:sp>
               <p:nvSpPr>
                 <p:cNvPr id="174" name="正方形/長方形 173">
@@ -11316,7 +11322,7 @@
                 <a:blipFill>
                   <a:blip r:embed="rId24"/>
                   <a:stretch>
-                    <a:fillRect/>
+                    <a:fillRect b="-3571"/>
                   </a:stretch>
                 </a:blipFill>
               </p:spPr>
@@ -13766,8 +13772,8 @@
             </p:sp>
           </mc:Fallback>
         </mc:AlternateContent>
-        <mc:AlternateContent xmlns:mc="http://schemas.openxmlformats.org/markup-compatibility/2006" xmlns:a14="http://schemas.microsoft.com/office/drawing/2010/main">
-          <mc:Choice Requires="a14">
+        <mc:AlternateContent xmlns:mc="http://schemas.openxmlformats.org/markup-compatibility/2006">
+          <mc:Choice xmlns:a14="http://schemas.microsoft.com/office/drawing/2010/main" Requires="a14">
             <p:sp>
               <p:nvSpPr>
                 <p:cNvPr id="165" name="正方形/長方形 164">
@@ -13838,6 +13844,12 @@
                                     <a:rPr kumimoji="1" lang="en-US" altLang="ja-JP" sz="600" b="0" i="1" smtClean="0">
                                       <a:latin typeface="Cambria Math" panose="02040503050406030204" pitchFamily="18" charset="0"/>
                                     </a:rPr>
+                                    <m:t>   </m:t>
+                                  </m:r>
+                                  <m:r>
+                                    <a:rPr kumimoji="1" lang="en-US" altLang="ja-JP" sz="600" b="0" i="1" smtClean="0">
+                                      <a:latin typeface="Cambria Math" panose="02040503050406030204" pitchFamily="18" charset="0"/>
+                                    </a:rPr>
                                     <m:t>0</m:t>
                                   </m:r>
                                 </m:e>
@@ -13846,7 +13858,7 @@
                                     <a:rPr kumimoji="1" lang="en-US" altLang="ja-JP" sz="600" b="0" i="1" smtClean="0">
                                       <a:latin typeface="Cambria Math" panose="02040503050406030204" pitchFamily="18" charset="0"/>
                                     </a:rPr>
-                                    <m:t>1</m:t>
+                                    <m:t>   1</m:t>
                                   </m:r>
                                 </m:e>
                                 <m:e>
@@ -13872,7 +13884,7 @@
                                     <a:rPr kumimoji="1" lang="en-US" altLang="ja-JP" sz="600" b="0" i="1" smtClean="0">
                                       <a:latin typeface="Cambria Math" panose="02040503050406030204" pitchFamily="18" charset="0"/>
                                     </a:rPr>
-                                    <m:t>0</m:t>
+                                    <m:t>   0</m:t>
                                   </m:r>
                                 </m:e>
                                 <m:e>
@@ -13890,7 +13902,7 @@
                                     <a:rPr kumimoji="1" lang="en-US" altLang="ja-JP" sz="600" b="0" i="1" smtClean="0">
                                       <a:latin typeface="Cambria Math" panose="02040503050406030204" pitchFamily="18" charset="0"/>
                                     </a:rPr>
-                                    <m:t>0</m:t>
+                                    <m:t>   0</m:t>
                                   </m:r>
                                 </m:e>
                                 <m:e>
@@ -13921,7 +13933,7 @@
               </p:txBody>
             </p:sp>
           </mc:Choice>
-          <mc:Fallback xmlns="">
+          <mc:Fallback>
             <p:sp>
               <p:nvSpPr>
                 <p:cNvPr id="165" name="正方形/長方形 164">
@@ -13947,7 +13959,7 @@
                 <a:blipFill>
                   <a:blip r:embed="rId33"/>
                   <a:stretch>
-                    <a:fillRect/>
+                    <a:fillRect b="-3571"/>
                   </a:stretch>
                 </a:blipFill>
               </p:spPr>
@@ -13980,8 +13992,8 @@
           </p:nvSpPr>
           <p:spPr>
             <a:xfrm>
-              <a:off x="3443852" y="2942986"/>
-              <a:ext cx="1042273" cy="523220"/>
+              <a:off x="3443852" y="3219034"/>
+              <a:ext cx="1042273" cy="246221"/>
             </a:xfrm>
             <a:prstGeom prst="rect">
               <a:avLst/>
@@ -13993,12 +14005,6 @@
               <a:spAutoFit/>
             </a:bodyPr>
             <a:lstStyle/>
-            <a:p>
-              <a:endParaRPr kumimoji="1" lang="en-US" altLang="ja-JP" i="1" dirty="0">
-                <a:latin typeface="Cambria Math" panose="02040503050406030204" pitchFamily="18" charset="0"/>
-                <a:ea typeface="Cambria Math" panose="02040503050406030204" pitchFamily="18" charset="0"/>
-              </a:endParaRPr>
-            </a:p>
             <a:p>
               <a:r>
                 <a:rPr kumimoji="1" lang="en-US" altLang="ja-JP" sz="1000" i="1" dirty="0">

</xml_diff>